<commit_message>
Add new ppts and Rescale ppts to 16:9
</commit_message>
<xml_diff>
--- a/全地至高是我主.pptx
+++ b/全地至高是我主.pptx
@@ -8,7 +8,7 @@
     <p:sldId id="256" r:id="rId2"/>
     <p:sldId id="257" r:id="rId3"/>
   </p:sldIdLst>
-  <p:sldSz cx="9144000" cy="6858000" type="screen4x3"/>
+  <p:sldSz cx="9144000" cy="5143500" type="screen16x9"/>
   <p:notesSz cx="6858000" cy="9144000"/>
   <p:defaultTextStyle>
     <a:defPPr>
@@ -137,8 +137,8 @@
         </p:nvSpPr>
         <p:spPr>
           <a:xfrm>
-            <a:off x="685800" y="2130425"/>
-            <a:ext cx="7772400" cy="1470025"/>
+            <a:off x="685800" y="1597819"/>
+            <a:ext cx="7772400" cy="1102519"/>
           </a:xfrm>
         </p:spPr>
         <p:txBody>
@@ -165,8 +165,8 @@
         </p:nvSpPr>
         <p:spPr>
           <a:xfrm>
-            <a:off x="1371600" y="3886200"/>
-            <a:ext cx="6400800" cy="1752600"/>
+            <a:off x="1371600" y="2914650"/>
+            <a:ext cx="6400800" cy="1314450"/>
           </a:xfrm>
         </p:spPr>
         <p:txBody>
@@ -290,7 +290,7 @@
             <a:fld id="{24CEFFAC-C82D-4C95-8241-BAD7B175EECB}" type="datetimeFigureOut">
               <a:rPr lang="zh-TW" altLang="en-US" smtClean="0"/>
               <a:pPr/>
-              <a:t>2018/9/18</a:t>
+              <a:t>2019/8/17</a:t>
             </a:fld>
             <a:endParaRPr lang="zh-TW" altLang="en-US"/>
           </a:p>
@@ -457,7 +457,7 @@
             <a:fld id="{24CEFFAC-C82D-4C95-8241-BAD7B175EECB}" type="datetimeFigureOut">
               <a:rPr lang="zh-TW" altLang="en-US" smtClean="0"/>
               <a:pPr/>
-              <a:t>2018/9/18</a:t>
+              <a:t>2019/8/17</a:t>
             </a:fld>
             <a:endParaRPr lang="zh-TW" altLang="en-US"/>
           </a:p>
@@ -543,8 +543,8 @@
         </p:nvSpPr>
         <p:spPr>
           <a:xfrm>
-            <a:off x="6629400" y="274638"/>
-            <a:ext cx="2057400" cy="5851525"/>
+            <a:off x="6629400" y="205979"/>
+            <a:ext cx="2057400" cy="4388644"/>
           </a:xfrm>
         </p:spPr>
         <p:txBody>
@@ -571,8 +571,8 @@
         </p:nvSpPr>
         <p:spPr>
           <a:xfrm>
-            <a:off x="457200" y="274638"/>
-            <a:ext cx="6019800" cy="5851525"/>
+            <a:off x="457200" y="205979"/>
+            <a:ext cx="6019800" cy="4388644"/>
           </a:xfrm>
         </p:spPr>
         <p:txBody>
@@ -634,7 +634,7 @@
             <a:fld id="{24CEFFAC-C82D-4C95-8241-BAD7B175EECB}" type="datetimeFigureOut">
               <a:rPr lang="zh-TW" altLang="en-US" smtClean="0"/>
               <a:pPr/>
-              <a:t>2018/9/18</a:t>
+              <a:t>2019/8/17</a:t>
             </a:fld>
             <a:endParaRPr lang="zh-TW" altLang="en-US"/>
           </a:p>
@@ -801,7 +801,7 @@
             <a:fld id="{24CEFFAC-C82D-4C95-8241-BAD7B175EECB}" type="datetimeFigureOut">
               <a:rPr lang="zh-TW" altLang="en-US" smtClean="0"/>
               <a:pPr/>
-              <a:t>2018/9/18</a:t>
+              <a:t>2019/8/17</a:t>
             </a:fld>
             <a:endParaRPr lang="zh-TW" altLang="en-US"/>
           </a:p>
@@ -887,8 +887,8 @@
         </p:nvSpPr>
         <p:spPr>
           <a:xfrm>
-            <a:off x="722313" y="4406900"/>
-            <a:ext cx="7772400" cy="1362075"/>
+            <a:off x="722313" y="3305176"/>
+            <a:ext cx="7772400" cy="1021556"/>
           </a:xfrm>
         </p:spPr>
         <p:txBody>
@@ -919,8 +919,8 @@
         </p:nvSpPr>
         <p:spPr>
           <a:xfrm>
-            <a:off x="722313" y="2906713"/>
-            <a:ext cx="7772400" cy="1500187"/>
+            <a:off x="722313" y="2180035"/>
+            <a:ext cx="7772400" cy="1125140"/>
           </a:xfrm>
         </p:spPr>
         <p:txBody>
@@ -1044,7 +1044,7 @@
             <a:fld id="{24CEFFAC-C82D-4C95-8241-BAD7B175EECB}" type="datetimeFigureOut">
               <a:rPr lang="zh-TW" altLang="en-US" smtClean="0"/>
               <a:pPr/>
-              <a:t>2018/9/18</a:t>
+              <a:t>2019/8/17</a:t>
             </a:fld>
             <a:endParaRPr lang="zh-TW" altLang="en-US"/>
           </a:p>
@@ -1153,8 +1153,8 @@
         </p:nvSpPr>
         <p:spPr>
           <a:xfrm>
-            <a:off x="457200" y="1600200"/>
-            <a:ext cx="4038600" cy="4525963"/>
+            <a:off x="457200" y="1200151"/>
+            <a:ext cx="4038600" cy="3394472"/>
           </a:xfrm>
         </p:spPr>
         <p:txBody>
@@ -1238,8 +1238,8 @@
         </p:nvSpPr>
         <p:spPr>
           <a:xfrm>
-            <a:off x="4648200" y="1600200"/>
-            <a:ext cx="4038600" cy="4525963"/>
+            <a:off x="4648200" y="1200151"/>
+            <a:ext cx="4038600" cy="3394472"/>
           </a:xfrm>
         </p:spPr>
         <p:txBody>
@@ -1329,7 +1329,7 @@
             <a:fld id="{24CEFFAC-C82D-4C95-8241-BAD7B175EECB}" type="datetimeFigureOut">
               <a:rPr lang="zh-TW" altLang="en-US" smtClean="0"/>
               <a:pPr/>
-              <a:t>2018/9/18</a:t>
+              <a:t>2019/8/17</a:t>
             </a:fld>
             <a:endParaRPr lang="zh-TW" altLang="en-US"/>
           </a:p>
@@ -1442,8 +1442,8 @@
         </p:nvSpPr>
         <p:spPr>
           <a:xfrm>
-            <a:off x="457200" y="1535113"/>
-            <a:ext cx="4040188" cy="639762"/>
+            <a:off x="457200" y="1151335"/>
+            <a:ext cx="4040188" cy="479822"/>
           </a:xfrm>
         </p:spPr>
         <p:txBody>
@@ -1507,8 +1507,8 @@
         </p:nvSpPr>
         <p:spPr>
           <a:xfrm>
-            <a:off x="457200" y="2174875"/>
-            <a:ext cx="4040188" cy="3951288"/>
+            <a:off x="457200" y="1631156"/>
+            <a:ext cx="4040188" cy="2963466"/>
           </a:xfrm>
         </p:spPr>
         <p:txBody>
@@ -1592,8 +1592,8 @@
         </p:nvSpPr>
         <p:spPr>
           <a:xfrm>
-            <a:off x="4645025" y="1535113"/>
-            <a:ext cx="4041775" cy="639762"/>
+            <a:off x="4645026" y="1151335"/>
+            <a:ext cx="4041775" cy="479822"/>
           </a:xfrm>
         </p:spPr>
         <p:txBody>
@@ -1657,8 +1657,8 @@
         </p:nvSpPr>
         <p:spPr>
           <a:xfrm>
-            <a:off x="4645025" y="2174875"/>
-            <a:ext cx="4041775" cy="3951288"/>
+            <a:off x="4645026" y="1631156"/>
+            <a:ext cx="4041775" cy="2963466"/>
           </a:xfrm>
         </p:spPr>
         <p:txBody>
@@ -1748,7 +1748,7 @@
             <a:fld id="{24CEFFAC-C82D-4C95-8241-BAD7B175EECB}" type="datetimeFigureOut">
               <a:rPr lang="zh-TW" altLang="en-US" smtClean="0"/>
               <a:pPr/>
-              <a:t>2018/9/18</a:t>
+              <a:t>2019/8/17</a:t>
             </a:fld>
             <a:endParaRPr lang="zh-TW" altLang="en-US"/>
           </a:p>
@@ -1863,7 +1863,7 @@
             <a:fld id="{24CEFFAC-C82D-4C95-8241-BAD7B175EECB}" type="datetimeFigureOut">
               <a:rPr lang="zh-TW" altLang="en-US" smtClean="0"/>
               <a:pPr/>
-              <a:t>2018/9/18</a:t>
+              <a:t>2019/8/17</a:t>
             </a:fld>
             <a:endParaRPr lang="zh-TW" altLang="en-US"/>
           </a:p>
@@ -1955,7 +1955,7 @@
             <a:fld id="{24CEFFAC-C82D-4C95-8241-BAD7B175EECB}" type="datetimeFigureOut">
               <a:rPr lang="zh-TW" altLang="en-US" smtClean="0"/>
               <a:pPr/>
-              <a:t>2018/9/18</a:t>
+              <a:t>2019/8/17</a:t>
             </a:fld>
             <a:endParaRPr lang="zh-TW" altLang="en-US"/>
           </a:p>
@@ -2041,8 +2041,8 @@
         </p:nvSpPr>
         <p:spPr>
           <a:xfrm>
-            <a:off x="457200" y="273050"/>
-            <a:ext cx="3008313" cy="1162050"/>
+            <a:off x="457201" y="204787"/>
+            <a:ext cx="3008313" cy="871538"/>
           </a:xfrm>
         </p:spPr>
         <p:txBody>
@@ -2073,8 +2073,8 @@
         </p:nvSpPr>
         <p:spPr>
           <a:xfrm>
-            <a:off x="3575050" y="273050"/>
-            <a:ext cx="5111750" cy="5853113"/>
+            <a:off x="3575050" y="204788"/>
+            <a:ext cx="5111750" cy="4389835"/>
           </a:xfrm>
         </p:spPr>
         <p:txBody>
@@ -2158,8 +2158,8 @@
         </p:nvSpPr>
         <p:spPr>
           <a:xfrm>
-            <a:off x="457200" y="1435100"/>
-            <a:ext cx="3008313" cy="4691063"/>
+            <a:off x="457201" y="1076326"/>
+            <a:ext cx="3008313" cy="3518297"/>
           </a:xfrm>
         </p:spPr>
         <p:txBody>
@@ -2229,7 +2229,7 @@
             <a:fld id="{24CEFFAC-C82D-4C95-8241-BAD7B175EECB}" type="datetimeFigureOut">
               <a:rPr lang="zh-TW" altLang="en-US" smtClean="0"/>
               <a:pPr/>
-              <a:t>2018/9/18</a:t>
+              <a:t>2019/8/17</a:t>
             </a:fld>
             <a:endParaRPr lang="zh-TW" altLang="en-US"/>
           </a:p>
@@ -2315,8 +2315,8 @@
         </p:nvSpPr>
         <p:spPr>
           <a:xfrm>
-            <a:off x="1792288" y="4800600"/>
-            <a:ext cx="5486400" cy="566738"/>
+            <a:off x="1792288" y="3600450"/>
+            <a:ext cx="5486400" cy="425054"/>
           </a:xfrm>
         </p:spPr>
         <p:txBody>
@@ -2347,8 +2347,8 @@
         </p:nvSpPr>
         <p:spPr>
           <a:xfrm>
-            <a:off x="1792288" y="612775"/>
-            <a:ext cx="5486400" cy="4114800"/>
+            <a:off x="1792288" y="459581"/>
+            <a:ext cx="5486400" cy="3086100"/>
           </a:xfrm>
         </p:spPr>
         <p:txBody>
@@ -2412,8 +2412,8 @@
         </p:nvSpPr>
         <p:spPr>
           <a:xfrm>
-            <a:off x="1792288" y="5367338"/>
-            <a:ext cx="5486400" cy="804862"/>
+            <a:off x="1792288" y="4025503"/>
+            <a:ext cx="5486400" cy="603647"/>
           </a:xfrm>
         </p:spPr>
         <p:txBody>
@@ -2483,7 +2483,7 @@
             <a:fld id="{24CEFFAC-C82D-4C95-8241-BAD7B175EECB}" type="datetimeFigureOut">
               <a:rPr lang="zh-TW" altLang="en-US" smtClean="0"/>
               <a:pPr/>
-              <a:t>2018/9/18</a:t>
+              <a:t>2019/8/17</a:t>
             </a:fld>
             <a:endParaRPr lang="zh-TW" altLang="en-US"/>
           </a:p>
@@ -2579,8 +2579,8 @@
         </p:nvSpPr>
         <p:spPr>
           <a:xfrm>
-            <a:off x="457200" y="274638"/>
-            <a:ext cx="8229600" cy="1143000"/>
+            <a:off x="457200" y="205979"/>
+            <a:ext cx="8229600" cy="857250"/>
           </a:xfrm>
           <a:prstGeom prst="rect">
             <a:avLst/>
@@ -2612,8 +2612,8 @@
         </p:nvSpPr>
         <p:spPr>
           <a:xfrm>
-            <a:off x="457200" y="1600200"/>
-            <a:ext cx="8229600" cy="4525963"/>
+            <a:off x="457200" y="1200151"/>
+            <a:ext cx="8229600" cy="3394472"/>
           </a:xfrm>
           <a:prstGeom prst="rect">
             <a:avLst/>
@@ -2674,8 +2674,8 @@
         </p:nvSpPr>
         <p:spPr>
           <a:xfrm>
-            <a:off x="457200" y="6356350"/>
-            <a:ext cx="2133600" cy="365125"/>
+            <a:off x="457200" y="4767263"/>
+            <a:ext cx="2133600" cy="273844"/>
           </a:xfrm>
           <a:prstGeom prst="rect">
             <a:avLst/>
@@ -2698,7 +2698,7 @@
             <a:fld id="{24CEFFAC-C82D-4C95-8241-BAD7B175EECB}" type="datetimeFigureOut">
               <a:rPr lang="zh-TW" altLang="en-US" smtClean="0"/>
               <a:pPr/>
-              <a:t>2018/9/18</a:t>
+              <a:t>2019/8/17</a:t>
             </a:fld>
             <a:endParaRPr lang="zh-TW" altLang="en-US"/>
           </a:p>
@@ -2716,8 +2716,8 @@
         </p:nvSpPr>
         <p:spPr>
           <a:xfrm>
-            <a:off x="3124200" y="6356350"/>
-            <a:ext cx="2895600" cy="365125"/>
+            <a:off x="3124200" y="4767263"/>
+            <a:ext cx="2895600" cy="273844"/>
           </a:xfrm>
           <a:prstGeom prst="rect">
             <a:avLst/>
@@ -2753,8 +2753,8 @@
         </p:nvSpPr>
         <p:spPr>
           <a:xfrm>
-            <a:off x="6553200" y="6356350"/>
-            <a:ext cx="2133600" cy="365125"/>
+            <a:off x="6553200" y="4767263"/>
+            <a:ext cx="2133600" cy="273844"/>
           </a:xfrm>
           <a:prstGeom prst="rect">
             <a:avLst/>
@@ -3081,11 +3081,13 @@
         </p:nvSpPr>
         <p:spPr/>
         <p:txBody>
-          <a:bodyPr/>
-          <a:lstStyle/>
-          <a:p>
-            <a:r>
-              <a:rPr lang="zh-TW" altLang="en-US" b="1" dirty="0">
+          <a:bodyPr>
+            <a:normAutofit/>
+          </a:bodyPr>
+          <a:lstStyle/>
+          <a:p>
+            <a:r>
+              <a:rPr lang="zh-TW" altLang="en-US" sz="4000" b="1" dirty="0">
                 <a:latin typeface="微軟正黑體" pitchFamily="34" charset="-120"/>
                 <a:ea typeface="微軟正黑體" pitchFamily="34" charset="-120"/>
               </a:rPr>
@@ -3106,8 +3108,8 @@
         </p:nvSpPr>
         <p:spPr>
           <a:xfrm>
-            <a:off x="0" y="1600200"/>
-            <a:ext cx="9144000" cy="4525963"/>
+            <a:off x="0" y="1200151"/>
+            <a:ext cx="9144000" cy="3394472"/>
           </a:xfrm>
         </p:spPr>
         <p:txBody>
@@ -3120,34 +3122,34 @@
               <a:buNone/>
             </a:pPr>
             <a:r>
-              <a:rPr lang="zh-TW" altLang="en-US" sz="5400" b="1" dirty="0">
+              <a:rPr lang="zh-TW" altLang="en-US" sz="4800" b="1" dirty="0">
                 <a:latin typeface="微軟正黑體" pitchFamily="34" charset="-120"/>
                 <a:ea typeface="微軟正黑體" pitchFamily="34" charset="-120"/>
               </a:rPr>
               <a:t>願靈內</a:t>
             </a:r>
             <a:r>
-              <a:rPr lang="zh-TW" altLang="en-US" sz="5400" b="1" dirty="0" smtClean="0">
+              <a:rPr lang="zh-TW" altLang="en-US" sz="4800" b="1" dirty="0" smtClean="0">
                 <a:latin typeface="微軟正黑體" pitchFamily="34" charset="-120"/>
                 <a:ea typeface="微軟正黑體" pitchFamily="34" charset="-120"/>
               </a:rPr>
               <a:t>甦醒  心</a:t>
             </a:r>
             <a:r>
-              <a:rPr lang="zh-TW" altLang="en-US" sz="5400" b="1" dirty="0">
+              <a:rPr lang="zh-TW" altLang="en-US" sz="4800" b="1" dirty="0">
                 <a:latin typeface="微軟正黑體" pitchFamily="34" charset="-120"/>
                 <a:ea typeface="微軟正黑體" pitchFamily="34" charset="-120"/>
               </a:rPr>
               <a:t>獻頌讚</a:t>
             </a:r>
             <a:r>
-              <a:rPr lang="zh-TW" altLang="en-US" sz="5400" b="1" dirty="0" smtClean="0">
+              <a:rPr lang="zh-TW" altLang="en-US" sz="4800" b="1" dirty="0" smtClean="0">
                 <a:latin typeface="微軟正黑體" pitchFamily="34" charset="-120"/>
                 <a:ea typeface="微軟正黑體" pitchFamily="34" charset="-120"/>
               </a:rPr>
               <a:t>歌聲</a:t>
             </a:r>
-            <a:endParaRPr lang="en-US" altLang="zh-TW" sz="5400" b="1" dirty="0">
+            <a:endParaRPr lang="en-US" altLang="zh-TW" sz="4800" b="1" dirty="0">
               <a:latin typeface="微軟正黑體" pitchFamily="34" charset="-120"/>
               <a:ea typeface="微軟正黑體" pitchFamily="34" charset="-120"/>
             </a:endParaRPr>
@@ -3157,41 +3159,41 @@
               <a:buNone/>
             </a:pPr>
             <a:r>
-              <a:rPr lang="zh-TW" altLang="en-US" sz="5400" b="1" dirty="0" smtClean="0">
+              <a:rPr lang="zh-TW" altLang="en-US" sz="4800" b="1" dirty="0" smtClean="0">
                 <a:latin typeface="微軟正黑體" pitchFamily="34" charset="-120"/>
                 <a:ea typeface="微軟正黑體" pitchFamily="34" charset="-120"/>
               </a:rPr>
               <a:t>投</a:t>
             </a:r>
             <a:r>
-              <a:rPr lang="zh-TW" altLang="en-US" sz="5400" b="1" dirty="0">
+              <a:rPr lang="zh-TW" altLang="en-US" sz="4800" b="1" dirty="0">
                 <a:latin typeface="微軟正黑體" pitchFamily="34" charset="-120"/>
                 <a:ea typeface="微軟正黑體" pitchFamily="34" charset="-120"/>
               </a:rPr>
               <a:t>在你的</a:t>
             </a:r>
             <a:r>
-              <a:rPr lang="zh-TW" altLang="en-US" sz="5400" b="1" dirty="0" smtClean="0">
+              <a:rPr lang="zh-TW" altLang="en-US" sz="4800" b="1" dirty="0" smtClean="0">
                 <a:latin typeface="微軟正黑體" pitchFamily="34" charset="-120"/>
                 <a:ea typeface="微軟正黑體" pitchFamily="34" charset="-120"/>
               </a:rPr>
               <a:t>翅膀  願</a:t>
             </a:r>
             <a:r>
-              <a:rPr lang="zh-TW" altLang="en-US" sz="5400" b="1" dirty="0">
+              <a:rPr lang="zh-TW" altLang="en-US" sz="4800" b="1" dirty="0">
                 <a:latin typeface="微軟正黑體" pitchFamily="34" charset="-120"/>
                 <a:ea typeface="微軟正黑體" pitchFamily="34" charset="-120"/>
               </a:rPr>
               <a:t>你施恩救</a:t>
             </a:r>
             <a:r>
-              <a:rPr lang="zh-TW" altLang="en-US" sz="5400" b="1" dirty="0" smtClean="0">
+              <a:rPr lang="zh-TW" altLang="en-US" sz="4800" b="1" dirty="0" smtClean="0">
                 <a:latin typeface="微軟正黑體" pitchFamily="34" charset="-120"/>
                 <a:ea typeface="微軟正黑體" pitchFamily="34" charset="-120"/>
               </a:rPr>
               <a:t>拯</a:t>
             </a:r>
-            <a:endParaRPr lang="en-US" altLang="zh-TW" sz="5400" b="1" dirty="0">
+            <a:endParaRPr lang="en-US" altLang="zh-TW" sz="4800" b="1" dirty="0">
               <a:latin typeface="微軟正黑體" pitchFamily="34" charset="-120"/>
               <a:ea typeface="微軟正黑體" pitchFamily="34" charset="-120"/>
             </a:endParaRPr>
@@ -3201,41 +3203,41 @@
               <a:buNone/>
             </a:pPr>
             <a:r>
-              <a:rPr lang="zh-TW" altLang="en-US" sz="5400" b="1" dirty="0" smtClean="0">
+              <a:rPr lang="zh-TW" altLang="en-US" sz="4800" b="1" dirty="0" smtClean="0">
                 <a:latin typeface="微軟正黑體" pitchFamily="34" charset="-120"/>
                 <a:ea typeface="微軟正黑體" pitchFamily="34" charset="-120"/>
               </a:rPr>
               <a:t>願</a:t>
             </a:r>
             <a:r>
-              <a:rPr lang="zh-TW" altLang="en-US" sz="5400" b="1" dirty="0">
+              <a:rPr lang="zh-TW" altLang="en-US" sz="4800" b="1" dirty="0">
                 <a:latin typeface="微軟正黑體" pitchFamily="34" charset="-120"/>
                 <a:ea typeface="微軟正黑體" pitchFamily="34" charset="-120"/>
               </a:rPr>
               <a:t>榮耀歸</a:t>
             </a:r>
             <a:r>
-              <a:rPr lang="zh-TW" altLang="en-US" sz="5400" b="1" dirty="0" smtClean="0">
+              <a:rPr lang="zh-TW" altLang="en-US" sz="4800" b="1" dirty="0" smtClean="0">
                 <a:latin typeface="微軟正黑體" pitchFamily="34" charset="-120"/>
                 <a:ea typeface="微軟正黑體" pitchFamily="34" charset="-120"/>
               </a:rPr>
               <a:t>主  高唱</a:t>
             </a:r>
             <a:r>
-              <a:rPr lang="zh-TW" altLang="en-US" sz="5400" b="1" dirty="0">
+              <a:rPr lang="zh-TW" altLang="en-US" sz="4800" b="1" dirty="0">
                 <a:latin typeface="微軟正黑體" pitchFamily="34" charset="-120"/>
                 <a:ea typeface="微軟正黑體" pitchFamily="34" charset="-120"/>
               </a:rPr>
               <a:t>頌讚新</a:t>
             </a:r>
             <a:r>
-              <a:rPr lang="zh-TW" altLang="en-US" sz="5400" b="1" dirty="0" smtClean="0">
+              <a:rPr lang="zh-TW" altLang="en-US" sz="4800" b="1" dirty="0" smtClean="0">
                 <a:latin typeface="微軟正黑體" pitchFamily="34" charset="-120"/>
                 <a:ea typeface="微軟正黑體" pitchFamily="34" charset="-120"/>
               </a:rPr>
               <a:t>歌</a:t>
             </a:r>
-            <a:endParaRPr lang="en-US" altLang="zh-TW" sz="5400" b="1" dirty="0">
+            <a:endParaRPr lang="en-US" altLang="zh-TW" sz="4800" b="1" dirty="0">
               <a:latin typeface="微軟正黑體" pitchFamily="34" charset="-120"/>
               <a:ea typeface="微軟正黑體" pitchFamily="34" charset="-120"/>
             </a:endParaRPr>
@@ -3245,28 +3247,28 @@
               <a:buNone/>
             </a:pPr>
             <a:r>
-              <a:rPr lang="zh-TW" altLang="en-US" sz="5400" b="1" dirty="0" smtClean="0">
+              <a:rPr lang="zh-TW" altLang="en-US" sz="4800" b="1" dirty="0" smtClean="0">
                 <a:latin typeface="微軟正黑體" pitchFamily="34" charset="-120"/>
                 <a:ea typeface="微軟正黑體" pitchFamily="34" charset="-120"/>
               </a:rPr>
               <a:t>琴</a:t>
             </a:r>
             <a:r>
-              <a:rPr lang="zh-TW" altLang="en-US" sz="5400" b="1" dirty="0">
+              <a:rPr lang="zh-TW" altLang="en-US" sz="4800" b="1" dirty="0">
                 <a:latin typeface="微軟正黑體" pitchFamily="34" charset="-120"/>
                 <a:ea typeface="微軟正黑體" pitchFamily="34" charset="-120"/>
               </a:rPr>
               <a:t>和應瑟奏</a:t>
             </a:r>
             <a:r>
-              <a:rPr lang="zh-TW" altLang="en-US" sz="5400" b="1" dirty="0" smtClean="0">
+              <a:rPr lang="zh-TW" altLang="en-US" sz="4800" b="1" dirty="0" smtClean="0">
                 <a:latin typeface="微軟正黑體" pitchFamily="34" charset="-120"/>
                 <a:ea typeface="微軟正黑體" pitchFamily="34" charset="-120"/>
               </a:rPr>
               <a:t>鳴  樂</a:t>
             </a:r>
             <a:r>
-              <a:rPr lang="zh-TW" altLang="en-US" sz="5400" b="1" dirty="0">
+              <a:rPr lang="zh-TW" altLang="en-US" sz="4800" b="1" dirty="0">
                 <a:latin typeface="微軟正黑體" pitchFamily="34" charset="-120"/>
                 <a:ea typeface="微軟正黑體" pitchFamily="34" charset="-120"/>
               </a:rPr>
@@ -3312,11 +3314,13 @@
         </p:nvSpPr>
         <p:spPr/>
         <p:txBody>
-          <a:bodyPr/>
-          <a:lstStyle/>
-          <a:p>
-            <a:r>
-              <a:rPr lang="zh-TW" altLang="en-US" b="1" dirty="0">
+          <a:bodyPr>
+            <a:normAutofit/>
+          </a:bodyPr>
+          <a:lstStyle/>
+          <a:p>
+            <a:r>
+              <a:rPr lang="zh-TW" altLang="en-US" sz="4000" b="1" dirty="0">
                 <a:latin typeface="微軟正黑體" pitchFamily="34" charset="-120"/>
                 <a:ea typeface="微軟正黑體" pitchFamily="34" charset="-120"/>
               </a:rPr>
@@ -3337,8 +3341,8 @@
         </p:nvSpPr>
         <p:spPr>
           <a:xfrm>
-            <a:off x="0" y="1600200"/>
-            <a:ext cx="9144000" cy="4525963"/>
+            <a:off x="0" y="1200151"/>
+            <a:ext cx="9144000" cy="3394472"/>
           </a:xfrm>
         </p:spPr>
         <p:txBody>
@@ -3351,50 +3355,55 @@
               <a:buNone/>
             </a:pPr>
             <a:r>
-              <a:rPr lang="zh-TW" altLang="en-US" sz="5400" b="1" dirty="0">
+              <a:rPr lang="zh-TW" altLang="en-US" sz="4800" b="1" dirty="0">
                 <a:latin typeface="微軟正黑體" pitchFamily="34" charset="-120"/>
                 <a:ea typeface="微軟正黑體" pitchFamily="34" charset="-120"/>
               </a:rPr>
               <a:t>全地至高是</a:t>
             </a:r>
             <a:r>
-              <a:rPr lang="zh-TW" altLang="en-US" sz="5400" b="1" dirty="0" smtClean="0">
+              <a:rPr lang="zh-TW" altLang="en-US" sz="4800" b="1" dirty="0">
                 <a:latin typeface="微軟正黑體" pitchFamily="34" charset="-120"/>
                 <a:ea typeface="微軟正黑體" pitchFamily="34" charset="-120"/>
               </a:rPr>
-              <a:t>我主</a:t>
-            </a:r>
-            <a:endParaRPr lang="en-US" altLang="zh-TW" sz="5400" b="1" dirty="0" smtClean="0">
-              <a:latin typeface="微軟正黑體" pitchFamily="34" charset="-120"/>
-              <a:ea typeface="微軟正黑體" pitchFamily="34" charset="-120"/>
-            </a:endParaRPr>
-          </a:p>
-          <a:p>
-            <a:pPr algn="ctr">
-              <a:buNone/>
-            </a:pPr>
-            <a:r>
-              <a:rPr lang="zh-TW" altLang="en-US" sz="5400" b="1" dirty="0" smtClean="0">
+              <a:t>我</a:t>
+            </a:r>
+            <a:r>
+              <a:rPr lang="zh-TW" altLang="en-US" sz="4800" b="1" dirty="0" smtClean="0">
+                <a:latin typeface="微軟正黑體" pitchFamily="34" charset="-120"/>
+                <a:ea typeface="微軟正黑體" pitchFamily="34" charset="-120"/>
+              </a:rPr>
+              <a:t>主</a:t>
+            </a:r>
+            <a:r>
+              <a:rPr lang="en-US" altLang="zh-TW" sz="4800" b="1" dirty="0" smtClean="0">
+                <a:latin typeface="微軟正黑體" pitchFamily="34" charset="-120"/>
+                <a:ea typeface="微軟正黑體" pitchFamily="34" charset="-120"/>
+              </a:rPr>
+              <a:t>  </a:t>
+            </a:r>
+            <a:r>
+              <a:rPr lang="zh-TW" altLang="en-US" sz="4800" b="1" dirty="0" smtClean="0">
                 <a:latin typeface="微軟正黑體" pitchFamily="34" charset="-120"/>
                 <a:ea typeface="微軟正黑體" pitchFamily="34" charset="-120"/>
               </a:rPr>
               <a:t>各</a:t>
             </a:r>
             <a:r>
-              <a:rPr lang="zh-TW" altLang="en-US" sz="5400" b="1" dirty="0">
+              <a:rPr lang="zh-TW" altLang="en-US" sz="4800" b="1" dirty="0">
                 <a:latin typeface="微軟正黑體" pitchFamily="34" charset="-120"/>
                 <a:ea typeface="微軟正黑體" pitchFamily="34" charset="-120"/>
               </a:rPr>
               <a:t>邦一致</a:t>
             </a:r>
             <a:r>
-              <a:rPr lang="zh-TW" altLang="en-US" sz="5400" b="1" dirty="0" smtClean="0">
+              <a:rPr lang="zh-TW" altLang="en-US" sz="4800" b="1" dirty="0">
                 <a:latin typeface="微軟正黑體" pitchFamily="34" charset="-120"/>
                 <a:ea typeface="微軟正黑體" pitchFamily="34" charset="-120"/>
               </a:rPr>
               <a:t>頌揚</a:t>
             </a:r>
-            <a:endParaRPr lang="en-US" altLang="zh-TW" sz="5400" b="1" dirty="0">
+            <a:endParaRPr lang="en-US" altLang="zh-TW" sz="4800" b="1" dirty="0">
               <a:latin typeface="微軟正黑體" pitchFamily="34" charset="-120"/>
               <a:ea typeface="微軟正黑體" pitchFamily="34" charset="-120"/>
             </a:endParaRPr>
@@ -3404,41 +3413,41 @@
               <a:buNone/>
             </a:pPr>
             <a:r>
-              <a:rPr lang="zh-TW" altLang="en-US" sz="5400" b="1" dirty="0" smtClean="0">
+              <a:rPr lang="zh-TW" altLang="en-US" sz="4800" b="1" dirty="0">
                 <a:latin typeface="微軟正黑體" pitchFamily="34" charset="-120"/>
                 <a:ea typeface="微軟正黑體" pitchFamily="34" charset="-120"/>
               </a:rPr>
               <a:t>讓</a:t>
             </a:r>
             <a:r>
-              <a:rPr lang="zh-TW" altLang="en-US" sz="5400" b="1" dirty="0">
+              <a:rPr lang="zh-TW" altLang="en-US" sz="4800" b="1" dirty="0">
                 <a:latin typeface="微軟正黑體" pitchFamily="34" charset="-120"/>
                 <a:ea typeface="微軟正黑體" pitchFamily="34" charset="-120"/>
               </a:rPr>
               <a:t>這歌盡獻</a:t>
             </a:r>
             <a:r>
-              <a:rPr lang="zh-TW" altLang="en-US" sz="5400" b="1" dirty="0" smtClean="0">
+              <a:rPr lang="zh-TW" altLang="en-US" sz="4800" b="1" dirty="0">
                 <a:latin typeface="微軟正黑體" pitchFamily="34" charset="-120"/>
                 <a:ea typeface="微軟正黑體" pitchFamily="34" charset="-120"/>
               </a:rPr>
               <a:t>主  榮光</a:t>
             </a:r>
             <a:r>
-              <a:rPr lang="zh-TW" altLang="en-US" sz="5400" b="1" dirty="0">
+              <a:rPr lang="zh-TW" altLang="en-US" sz="4800" b="1" dirty="0">
                 <a:latin typeface="微軟正黑體" pitchFamily="34" charset="-120"/>
                 <a:ea typeface="微軟正黑體" pitchFamily="34" charset="-120"/>
               </a:rPr>
               <a:t>高照諸</a:t>
             </a:r>
             <a:r>
-              <a:rPr lang="zh-TW" altLang="en-US" sz="5400" b="1" dirty="0" smtClean="0">
+              <a:rPr lang="zh-TW" altLang="en-US" sz="4800" b="1" dirty="0">
                 <a:latin typeface="微軟正黑體" pitchFamily="34" charset="-120"/>
                 <a:ea typeface="微軟正黑體" pitchFamily="34" charset="-120"/>
               </a:rPr>
               <a:t>天</a:t>
             </a:r>
-            <a:endParaRPr lang="en-US" altLang="zh-TW" sz="5400" b="1" dirty="0">
+            <a:endParaRPr lang="en-US" altLang="zh-TW" sz="4800" b="1" dirty="0">
               <a:latin typeface="微軟正黑體" pitchFamily="34" charset="-120"/>
               <a:ea typeface="微軟正黑體" pitchFamily="34" charset="-120"/>
             </a:endParaRPr>
@@ -3448,41 +3457,41 @@
               <a:buNone/>
             </a:pPr>
             <a:r>
-              <a:rPr lang="zh-TW" altLang="en-US" sz="5400" b="1" dirty="0" smtClean="0">
+              <a:rPr lang="zh-TW" altLang="en-US" sz="4800" b="1" dirty="0">
                 <a:latin typeface="微軟正黑體" pitchFamily="34" charset="-120"/>
                 <a:ea typeface="微軟正黑體" pitchFamily="34" charset="-120"/>
               </a:rPr>
               <a:t>慈愛</a:t>
             </a:r>
             <a:r>
-              <a:rPr lang="zh-TW" altLang="en-US" sz="5400" b="1" dirty="0">
+              <a:rPr lang="zh-TW" altLang="en-US" sz="4800" b="1" dirty="0">
                 <a:latin typeface="微軟正黑體" pitchFamily="34" charset="-120"/>
                 <a:ea typeface="微軟正黑體" pitchFamily="34" charset="-120"/>
               </a:rPr>
               <a:t>達到穹蒼</a:t>
             </a:r>
             <a:r>
-              <a:rPr lang="zh-TW" altLang="en-US" sz="5400" b="1" dirty="0" smtClean="0">
+              <a:rPr lang="zh-TW" altLang="en-US" sz="4800" b="1" dirty="0">
                 <a:latin typeface="微軟正黑體" pitchFamily="34" charset="-120"/>
                 <a:ea typeface="微軟正黑體" pitchFamily="34" charset="-120"/>
               </a:rPr>
               <a:t>處  恩</a:t>
             </a:r>
             <a:r>
-              <a:rPr lang="zh-TW" altLang="en-US" sz="5400" b="1" dirty="0">
+              <a:rPr lang="zh-TW" altLang="en-US" sz="4800" b="1" dirty="0">
                 <a:latin typeface="微軟正黑體" pitchFamily="34" charset="-120"/>
                 <a:ea typeface="微軟正黑體" pitchFamily="34" charset="-120"/>
               </a:rPr>
               <a:t>慈</a:t>
             </a:r>
             <a:r>
-              <a:rPr lang="zh-TW" altLang="en-US" sz="5400" b="1" dirty="0" smtClean="0">
+              <a:rPr lang="zh-TW" altLang="en-US" sz="4800" b="1" dirty="0">
                 <a:latin typeface="微軟正黑體" pitchFamily="34" charset="-120"/>
                 <a:ea typeface="微軟正黑體" pitchFamily="34" charset="-120"/>
               </a:rPr>
               <a:t>信實</a:t>
             </a:r>
-            <a:endParaRPr lang="en-US" altLang="zh-TW" sz="5400" b="1" dirty="0" smtClean="0">
+            <a:endParaRPr lang="en-US" altLang="zh-TW" sz="4800" b="1" dirty="0">
               <a:latin typeface="微軟正黑體" pitchFamily="34" charset="-120"/>
               <a:ea typeface="微軟正黑體" pitchFamily="34" charset="-120"/>
             </a:endParaRPr>
@@ -3492,14 +3501,14 @@
               <a:buNone/>
             </a:pPr>
             <a:r>
-              <a:rPr lang="zh-TW" altLang="en-US" sz="5400" b="1" dirty="0" smtClean="0">
+              <a:rPr lang="zh-TW" altLang="en-US" sz="4800" b="1" dirty="0">
                 <a:latin typeface="微軟正黑體" pitchFamily="34" charset="-120"/>
                 <a:ea typeface="微軟正黑體" pitchFamily="34" charset="-120"/>
               </a:rPr>
               <a:t>並</a:t>
             </a:r>
             <a:r>
-              <a:rPr lang="zh-TW" altLang="en-US" sz="5400" b="1" dirty="0">
+              <a:rPr lang="zh-TW" altLang="en-US" sz="4800" b="1" dirty="0">
                 <a:latin typeface="微軟正黑體" pitchFamily="34" charset="-120"/>
                 <a:ea typeface="微軟正黑體" pitchFamily="34" charset="-120"/>
               </a:rPr>

</xml_diff>